<commit_message>
removed extra OReilly link on References slide
</commit_message>
<xml_diff>
--- a/class notes/Python Basics (Theory).pptx
+++ b/class notes/Python Basics (Theory).pptx
@@ -849,7 +849,7 @@
             <a:fld id="{B61BEF0D-F0BB-DE4B-95CE-6DB70DBA9567}" type="datetimeFigureOut">
               <a:rPr lang="en-US" dirty="0"/>
               <a:pPr/>
-              <a:t>2/3/2020</a:t>
+              <a:t>2/4/2020</a:t>
             </a:fld>
             <a:endParaRPr lang="en-US" dirty="0"/>
           </a:p>
@@ -1097,7 +1097,7 @@
             <a:fld id="{B61BEF0D-F0BB-DE4B-95CE-6DB70DBA9567}" type="datetimeFigureOut">
               <a:rPr lang="en-US" dirty="0"/>
               <a:pPr/>
-              <a:t>2/3/2020</a:t>
+              <a:t>2/4/2020</a:t>
             </a:fld>
             <a:endParaRPr lang="en-US" dirty="0"/>
           </a:p>
@@ -1408,7 +1408,7 @@
             <a:fld id="{B61BEF0D-F0BB-DE4B-95CE-6DB70DBA9567}" type="datetimeFigureOut">
               <a:rPr lang="en-US" dirty="0"/>
               <a:pPr/>
-              <a:t>2/3/2020</a:t>
+              <a:t>2/4/2020</a:t>
             </a:fld>
             <a:endParaRPr lang="en-US" dirty="0"/>
           </a:p>
@@ -1746,7 +1746,7 @@
             <a:fld id="{B61BEF0D-F0BB-DE4B-95CE-6DB70DBA9567}" type="datetimeFigureOut">
               <a:rPr lang="en-US" dirty="0"/>
               <a:pPr/>
-              <a:t>2/3/2020</a:t>
+              <a:t>2/4/2020</a:t>
             </a:fld>
             <a:endParaRPr lang="en-US" dirty="0"/>
           </a:p>
@@ -2057,7 +2057,7 @@
             <a:fld id="{B61BEF0D-F0BB-DE4B-95CE-6DB70DBA9567}" type="datetimeFigureOut">
               <a:rPr lang="en-US" dirty="0"/>
               <a:pPr/>
-              <a:t>2/3/2020</a:t>
+              <a:t>2/4/2020</a:t>
             </a:fld>
             <a:endParaRPr lang="en-US" dirty="0"/>
           </a:p>
@@ -2447,7 +2447,7 @@
             <a:fld id="{B61BEF0D-F0BB-DE4B-95CE-6DB70DBA9567}" type="datetimeFigureOut">
               <a:rPr lang="en-US" dirty="0"/>
               <a:pPr/>
-              <a:t>2/3/2020</a:t>
+              <a:t>2/4/2020</a:t>
             </a:fld>
             <a:endParaRPr lang="en-US" dirty="0"/>
           </a:p>
@@ -2613,7 +2613,7 @@
           <a:p>
             <a:fld id="{55C6B4A9-1611-4792-9094-5F34BCA07E0B}" type="datetimeFigureOut">
               <a:rPr lang="en-US" dirty="0"/>
-              <a:t>2/3/2020</a:t>
+              <a:t>2/4/2020</a:t>
             </a:fld>
             <a:endParaRPr lang="en-US" dirty="0"/>
           </a:p>
@@ -2789,7 +2789,7 @@
             <a:fld id="{B61BEF0D-F0BB-DE4B-95CE-6DB70DBA9567}" type="datetimeFigureOut">
               <a:rPr lang="en-US" dirty="0"/>
               <a:pPr/>
-              <a:t>2/3/2020</a:t>
+              <a:t>2/4/2020</a:t>
             </a:fld>
             <a:endParaRPr lang="en-US" dirty="0"/>
           </a:p>
@@ -2962,7 +2962,7 @@
             <a:fld id="{B61BEF0D-F0BB-DE4B-95CE-6DB70DBA9567}" type="datetimeFigureOut">
               <a:rPr lang="en-US" dirty="0"/>
               <a:pPr/>
-              <a:t>2/3/2020</a:t>
+              <a:t>2/4/2020</a:t>
             </a:fld>
             <a:endParaRPr lang="en-US" dirty="0"/>
           </a:p>
@@ -3206,7 +3206,7 @@
             <a:fld id="{B61BEF0D-F0BB-DE4B-95CE-6DB70DBA9567}" type="datetimeFigureOut">
               <a:rPr lang="en-US" dirty="0"/>
               <a:pPr/>
-              <a:t>2/3/2020</a:t>
+              <a:t>2/4/2020</a:t>
             </a:fld>
             <a:endParaRPr lang="en-US" dirty="0"/>
           </a:p>
@@ -3434,7 +3434,7 @@
           <a:p>
             <a:fld id="{EB712588-04B1-427B-82EE-E8DB90309F08}" type="datetimeFigureOut">
               <a:rPr lang="en-US" dirty="0"/>
-              <a:t>2/3/2020</a:t>
+              <a:t>2/4/2020</a:t>
             </a:fld>
             <a:endParaRPr lang="en-US" dirty="0"/>
           </a:p>
@@ -3804,7 +3804,7 @@
             <a:fld id="{B61BEF0D-F0BB-DE4B-95CE-6DB70DBA9567}" type="datetimeFigureOut">
               <a:rPr lang="en-US" dirty="0"/>
               <a:pPr/>
-              <a:t>2/3/2020</a:t>
+              <a:t>2/4/2020</a:t>
             </a:fld>
             <a:endParaRPr lang="en-US" dirty="0"/>
           </a:p>
@@ -3924,7 +3924,7 @@
             <a:fld id="{B61BEF0D-F0BB-DE4B-95CE-6DB70DBA9567}" type="datetimeFigureOut">
               <a:rPr lang="en-US" dirty="0"/>
               <a:pPr/>
-              <a:t>2/3/2020</a:t>
+              <a:t>2/4/2020</a:t>
             </a:fld>
             <a:endParaRPr lang="en-US" dirty="0"/>
           </a:p>
@@ -4016,7 +4016,7 @@
             <a:fld id="{B61BEF0D-F0BB-DE4B-95CE-6DB70DBA9567}" type="datetimeFigureOut">
               <a:rPr lang="en-US" dirty="0"/>
               <a:pPr/>
-              <a:t>2/3/2020</a:t>
+              <a:t>2/4/2020</a:t>
             </a:fld>
             <a:endParaRPr lang="en-US" dirty="0"/>
           </a:p>
@@ -4267,7 +4267,7 @@
           <a:p>
             <a:fld id="{42A54C80-263E-416B-A8E0-580EDEADCBDC}" type="datetimeFigureOut">
               <a:rPr lang="en-US" dirty="0"/>
-              <a:t>2/3/2020</a:t>
+              <a:t>2/4/2020</a:t>
             </a:fld>
             <a:endParaRPr lang="en-US" dirty="0"/>
           </a:p>
@@ -4526,7 +4526,7 @@
             <a:fld id="{B61BEF0D-F0BB-DE4B-95CE-6DB70DBA9567}" type="datetimeFigureOut">
               <a:rPr lang="en-US" dirty="0"/>
               <a:pPr/>
-              <a:t>2/3/2020</a:t>
+              <a:t>2/4/2020</a:t>
             </a:fld>
             <a:endParaRPr lang="en-US" dirty="0"/>
           </a:p>
@@ -5266,7 +5266,7 @@
             <a:fld id="{B61BEF0D-F0BB-DE4B-95CE-6DB70DBA9567}" type="datetimeFigureOut">
               <a:rPr lang="en-US" dirty="0"/>
               <a:pPr/>
-              <a:t>2/3/2020</a:t>
+              <a:t>2/4/2020</a:t>
             </a:fld>
             <a:endParaRPr lang="en-US" dirty="0"/>
           </a:p>
@@ -5826,13 +5826,8 @@
           <a:p>
             <a:r>
               <a:rPr lang="en-US" dirty="0" smtClean="0"/>
-              <a:t>Jessica </a:t>
-            </a:r>
-            <a:r>
-              <a:rPr lang="en-US" dirty="0" smtClean="0"/>
-              <a:t>Randall, MPH</a:t>
-            </a:r>
-            <a:endParaRPr lang="en-US" dirty="0" smtClean="0"/>
+              <a:t>Jessica Randall, MPH</a:t>
+            </a:r>
           </a:p>
           <a:p>
             <a:r>
@@ -5853,6 +5848,13 @@
   <p:clrMapOvr>
     <a:masterClrMapping/>
   </p:clrMapOvr>
+  <p:timing>
+    <p:tnLst>
+      <p:par>
+        <p:cTn id="1" dur="indefinite" restart="never" nodeType="tmRoot"/>
+      </p:par>
+    </p:tnLst>
+  </p:timing>
 </p:sld>
 </file>
 
@@ -5983,6 +5985,13 @@
   <p:clrMapOvr>
     <a:masterClrMapping/>
   </p:clrMapOvr>
+  <p:timing>
+    <p:tnLst>
+      <p:par>
+        <p:cTn id="1" dur="indefinite" restart="never" nodeType="tmRoot"/>
+      </p:par>
+    </p:tnLst>
+  </p:timing>
 </p:sld>
 </file>
 
@@ -6193,6 +6202,13 @@
   <p:clrMapOvr>
     <a:masterClrMapping/>
   </p:clrMapOvr>
+  <p:timing>
+    <p:tnLst>
+      <p:par>
+        <p:cTn id="1" dur="indefinite" restart="never" nodeType="tmRoot"/>
+      </p:par>
+    </p:tnLst>
+  </p:timing>
 </p:sld>
 </file>
 
@@ -6316,6 +6332,13 @@
   <p:clrMapOvr>
     <a:masterClrMapping/>
   </p:clrMapOvr>
+  <p:timing>
+    <p:tnLst>
+      <p:par>
+        <p:cTn id="1" dur="indefinite" restart="never" nodeType="tmRoot"/>
+      </p:par>
+    </p:tnLst>
+  </p:timing>
 </p:sld>
 </file>
 
@@ -6394,6 +6417,13 @@
   <p:clrMapOvr>
     <a:masterClrMapping/>
   </p:clrMapOvr>
+  <p:timing>
+    <p:tnLst>
+      <p:par>
+        <p:cTn id="1" dur="indefinite" restart="never" nodeType="tmRoot"/>
+      </p:par>
+    </p:tnLst>
+  </p:timing>
 </p:sld>
 </file>
 
@@ -6490,6 +6520,13 @@
   <p:clrMapOvr>
     <a:masterClrMapping/>
   </p:clrMapOvr>
+  <p:timing>
+    <p:tnLst>
+      <p:par>
+        <p:cTn id="1" dur="indefinite" restart="never" nodeType="tmRoot"/>
+      </p:par>
+    </p:tnLst>
+  </p:timing>
 </p:sld>
 </file>
 
@@ -6546,7 +6583,7 @@
         <p:spPr/>
         <p:txBody>
           <a:bodyPr>
-            <a:normAutofit fontScale="85000" lnSpcReduction="20000"/>
+            <a:normAutofit fontScale="85000" lnSpcReduction="10000"/>
           </a:bodyPr>
           <a:lstStyle/>
           <a:p>
@@ -6601,20 +6638,17 @@
             </a:r>
             <a:r>
               <a:rPr lang="en-US" dirty="0" smtClean="0"/>
-              <a:t>from Johns Hopkins University</a:t>
-            </a:r>
-          </a:p>
-          <a:p>
-            <a:r>
-              <a:rPr lang="en-US" dirty="0" smtClean="0">
-                <a:hlinkClick r:id="rId4"/>
-              </a:rPr>
-              <a:t>Python Cookbook </a:t>
-            </a:r>
-            <a:r>
-              <a:rPr lang="en-US" dirty="0" smtClean="0"/>
-              <a:t>from O’Reilly</a:t>
-            </a:r>
+              <a:t>from Johns </a:t>
+            </a:r>
+            <a:r>
+              <a:rPr lang="en-US" smtClean="0"/>
+              <a:t>Hopkins </a:t>
+            </a:r>
+            <a:r>
+              <a:rPr lang="en-US" smtClean="0"/>
+              <a:t>University</a:t>
+            </a:r>
+            <a:endParaRPr lang="en-US" dirty="0" smtClean="0"/>
           </a:p>
           <a:p>
             <a:pPr marL="0" indent="0">
@@ -6709,6 +6743,13 @@
   <p:clrMapOvr>
     <a:masterClrMapping/>
   </p:clrMapOvr>
+  <p:timing>
+    <p:tnLst>
+      <p:par>
+        <p:cTn id="1" dur="indefinite" restart="never" nodeType="tmRoot"/>
+      </p:par>
+    </p:tnLst>
+  </p:timing>
 </p:sld>
 </file>
 
@@ -6891,6 +6932,13 @@
   <p:clrMapOvr>
     <a:masterClrMapping/>
   </p:clrMapOvr>
+  <p:timing>
+    <p:tnLst>
+      <p:par>
+        <p:cTn id="1" dur="indefinite" restart="never" nodeType="tmRoot"/>
+      </p:par>
+    </p:tnLst>
+  </p:timing>
 </p:sld>
 </file>
 
@@ -7012,6 +7060,13 @@
   <p:clrMapOvr>
     <a:masterClrMapping/>
   </p:clrMapOvr>
+  <p:timing>
+    <p:tnLst>
+      <p:par>
+        <p:cTn id="1" dur="indefinite" restart="never" nodeType="tmRoot"/>
+      </p:par>
+    </p:tnLst>
+  </p:timing>
 </p:sld>
 </file>
 
@@ -7229,6 +7284,13 @@
   <p:clrMapOvr>
     <a:masterClrMapping/>
   </p:clrMapOvr>
+  <p:timing>
+    <p:tnLst>
+      <p:par>
+        <p:cTn id="1" dur="indefinite" restart="never" nodeType="tmRoot"/>
+      </p:par>
+    </p:tnLst>
+  </p:timing>
 </p:sld>
 </file>
 
@@ -7345,6 +7407,13 @@
   <p:clrMapOvr>
     <a:masterClrMapping/>
   </p:clrMapOvr>
+  <p:timing>
+    <p:tnLst>
+      <p:par>
+        <p:cTn id="1" dur="indefinite" restart="never" nodeType="tmRoot"/>
+      </p:par>
+    </p:tnLst>
+  </p:timing>
 </p:sld>
 </file>
 
@@ -7495,11 +7564,7 @@
           <a:p>
             <a:r>
               <a:rPr lang="en-US" dirty="0" smtClean="0"/>
-              <a:t>A</a:t>
-            </a:r>
-            <a:r>
-              <a:rPr lang="en-US" dirty="0" smtClean="0"/>
-              <a:t>rguments</a:t>
+              <a:t>Arguments</a:t>
             </a:r>
           </a:p>
           <a:p>
@@ -7563,6 +7628,13 @@
   <p:clrMapOvr>
     <a:masterClrMapping/>
   </p:clrMapOvr>
+  <p:timing>
+    <p:tnLst>
+      <p:par>
+        <p:cTn id="1" dur="indefinite" restart="never" nodeType="tmRoot"/>
+      </p:par>
+    </p:tnLst>
+  </p:timing>
 </p:sld>
 </file>
 
@@ -7700,6 +7772,13 @@
   <p:clrMapOvr>
     <a:masterClrMapping/>
   </p:clrMapOvr>
+  <p:timing>
+    <p:tnLst>
+      <p:par>
+        <p:cTn id="1" dur="indefinite" restart="never" nodeType="tmRoot"/>
+      </p:par>
+    </p:tnLst>
+  </p:timing>
 </p:sld>
 </file>
 
@@ -7813,6 +7892,13 @@
   <p:clrMapOvr>
     <a:masterClrMapping/>
   </p:clrMapOvr>
+  <p:timing>
+    <p:tnLst>
+      <p:par>
+        <p:cTn id="1" dur="indefinite" restart="never" nodeType="tmRoot"/>
+      </p:par>
+    </p:tnLst>
+  </p:timing>
 </p:sld>
 </file>
 
@@ -7994,6 +8080,13 @@
   <p:clrMapOvr>
     <a:masterClrMapping/>
   </p:clrMapOvr>
+  <p:timing>
+    <p:tnLst>
+      <p:par>
+        <p:cTn id="1" dur="indefinite" restart="never" nodeType="tmRoot"/>
+      </p:par>
+    </p:tnLst>
+  </p:timing>
 </p:sld>
 </file>
 

</xml_diff>